<commit_message>
April 18th 10:35 Update Final Presentation
</commit_message>
<xml_diff>
--- a/Capstone/Connecticut Traffic Stop Final.pptx
+++ b/Capstone/Connecticut Traffic Stop Final.pptx
@@ -15,13 +15,15 @@
     <p:sldId id="259" r:id="rId9"/>
     <p:sldId id="269" r:id="rId10"/>
     <p:sldId id="267" r:id="rId11"/>
-    <p:sldId id="260" r:id="rId12"/>
-    <p:sldId id="261" r:id="rId13"/>
-    <p:sldId id="268" r:id="rId14"/>
-    <p:sldId id="270" r:id="rId15"/>
-    <p:sldId id="271" r:id="rId16"/>
-    <p:sldId id="272" r:id="rId17"/>
-    <p:sldId id="273" r:id="rId18"/>
+    <p:sldId id="274" r:id="rId12"/>
+    <p:sldId id="275" r:id="rId13"/>
+    <p:sldId id="260" r:id="rId14"/>
+    <p:sldId id="261" r:id="rId15"/>
+    <p:sldId id="268" r:id="rId16"/>
+    <p:sldId id="270" r:id="rId17"/>
+    <p:sldId id="271" r:id="rId18"/>
+    <p:sldId id="272" r:id="rId19"/>
+    <p:sldId id="273" r:id="rId20"/>
   </p:sldIdLst>
   <p:sldSz cx="9144000" cy="6858000" type="screen4x3"/>
   <p:notesSz cx="6858000" cy="9144000"/>
@@ -3556,7 +3558,9 @@
           </a:xfrm>
         </p:spPr>
         <p:txBody>
-          <a:bodyPr/>
+          <a:bodyPr>
+            <a:normAutofit lnSpcReduction="10000"/>
+          </a:bodyPr>
           <a:lstStyle/>
           <a:p>
             <a:r>
@@ -3586,7 +3590,7 @@
             </a:r>
             <a:r>
               <a:rPr lang="en-US" dirty="0" smtClean="0"/>
-              <a:t>Large Population, Low Income City with Large Black and Hispanic Populations</a:t>
+              <a:t>Large Population, Low Income City with Large Black and Hispanic Populations (9 Cities, Example: Bridgeport)</a:t>
             </a:r>
           </a:p>
           <a:p>
@@ -3601,7 +3605,7 @@
             </a:r>
             <a:r>
               <a:rPr lang="en-US" dirty="0" smtClean="0"/>
-              <a:t>Medium Population, Medium Income City with Large White Population</a:t>
+              <a:t>Medium Population, Medium Income City with Large White Population (12 Cities, Example: Trumbull)</a:t>
             </a:r>
           </a:p>
           <a:p>
@@ -3616,7 +3620,7 @@
             </a:r>
             <a:r>
               <a:rPr lang="en-US" dirty="0" smtClean="0"/>
-              <a:t>Small Population, Low Income City with Decent Sized Black, Hispanic and Asian Population</a:t>
+              <a:t>Small Population, Low Income City with Small Sized Black, Hispanic and Asian Population (41 Towns, Example: Vernon)</a:t>
             </a:r>
           </a:p>
           <a:p>
@@ -3631,7 +3635,7 @@
             </a:r>
             <a:r>
               <a:rPr lang="en-US" dirty="0" smtClean="0"/>
-              <a:t>: Small, Majority White and Wealthy Cities</a:t>
+              <a:t>: Small, Majority White and Wealthy Cities (5 Towns, Example: Darien)</a:t>
             </a:r>
             <a:endParaRPr lang="en-US" dirty="0"/>
           </a:p>
@@ -3706,6 +3710,396 @@
       </p:grpSpPr>
       <p:pic>
         <p:nvPicPr>
+          <p:cNvPr id="4" name="Content Placeholder 3" descr="Screen Shot 2017-04-18 at 9.26.05 AM.png"/>
+          <p:cNvPicPr>
+            <a:picLocks noGrp="1" noChangeAspect="1"/>
+          </p:cNvPicPr>
+          <p:nvPr>
+            <p:ph idx="1"/>
+          </p:nvPr>
+        </p:nvPicPr>
+        <p:blipFill rotWithShape="1">
+          <a:blip r:embed="rId2">
+            <a:extLst>
+              <a:ext uri="{28A0092B-C50C-407E-A947-70E740481C1C}">
+                <a14:useLocalDpi xmlns:a14="http://schemas.microsoft.com/office/drawing/2010/main" val="0"/>
+              </a:ext>
+            </a:extLst>
+          </a:blip>
+          <a:srcRect l="2211" r="787"/>
+          <a:stretch/>
+        </p:blipFill>
+        <p:spPr>
+          <a:xfrm>
+            <a:off x="293335" y="1559236"/>
+            <a:ext cx="4219519" cy="3911200"/>
+          </a:xfrm>
+        </p:spPr>
+      </p:pic>
+      <p:pic>
+        <p:nvPicPr>
+          <p:cNvPr id="5" name="Picture 4" descr="Screen Shot 2017-04-18 at 9.28.59 AM.png"/>
+          <p:cNvPicPr>
+            <a:picLocks noChangeAspect="1"/>
+          </p:cNvPicPr>
+          <p:nvPr/>
+        </p:nvPicPr>
+        <p:blipFill>
+          <a:blip r:embed="rId3">
+            <a:extLst>
+              <a:ext uri="{28A0092B-C50C-407E-A947-70E740481C1C}">
+                <a14:useLocalDpi xmlns:a14="http://schemas.microsoft.com/office/drawing/2010/main" val="0"/>
+              </a:ext>
+            </a:extLst>
+          </a:blip>
+          <a:stretch>
+            <a:fillRect/>
+          </a:stretch>
+        </p:blipFill>
+        <p:spPr>
+          <a:xfrm>
+            <a:off x="4642837" y="1559236"/>
+            <a:ext cx="4250561" cy="4017149"/>
+          </a:xfrm>
+          <a:prstGeom prst="rect">
+            <a:avLst/>
+          </a:prstGeom>
+        </p:spPr>
+      </p:pic>
+      <p:sp>
+        <p:nvSpPr>
+          <p:cNvPr id="6" name="Title 1"/>
+          <p:cNvSpPr txBox="1">
+            <a:spLocks/>
+          </p:cNvSpPr>
+          <p:nvPr/>
+        </p:nvSpPr>
+        <p:spPr>
+          <a:xfrm>
+            <a:off x="1675302" y="743677"/>
+            <a:ext cx="1019128" cy="662742"/>
+          </a:xfrm>
+          <a:prstGeom prst="rect">
+            <a:avLst/>
+          </a:prstGeom>
+        </p:spPr>
+        <p:txBody>
+          <a:bodyPr vert="horz" lIns="91440" tIns="45720" rIns="91440" bIns="45720" rtlCol="0" anchor="ctr">
+            <a:normAutofit fontScale="97500"/>
+          </a:bodyPr>
+          <a:lstStyle>
+            <a:lvl1pPr algn="l" defTabSz="914400" rtl="0" eaLnBrk="1" latinLnBrk="0" hangingPunct="1">
+              <a:spcBef>
+                <a:spcPct val="0"/>
+              </a:spcBef>
+              <a:buNone/>
+              <a:defRPr sz="4000" kern="1200" spc="-100" baseline="0">
+                <a:solidFill>
+                  <a:schemeClr val="tx2"/>
+                </a:solidFill>
+                <a:latin typeface="+mj-lt"/>
+                <a:ea typeface="+mj-ea"/>
+                <a:cs typeface="+mj-cs"/>
+              </a:defRPr>
+            </a:lvl1pPr>
+          </a:lstStyle>
+          <a:p>
+            <a:r>
+              <a:rPr lang="en-US" sz="1800" dirty="0" smtClean="0"/>
+              <a:t>Group 0</a:t>
+            </a:r>
+            <a:endParaRPr lang="en-US" sz="1800" dirty="0"/>
+          </a:p>
+        </p:txBody>
+      </p:sp>
+      <p:sp>
+        <p:nvSpPr>
+          <p:cNvPr id="7" name="Title 1"/>
+          <p:cNvSpPr txBox="1">
+            <a:spLocks/>
+          </p:cNvSpPr>
+          <p:nvPr/>
+        </p:nvSpPr>
+        <p:spPr>
+          <a:xfrm>
+            <a:off x="6252053" y="896077"/>
+            <a:ext cx="1019128" cy="662742"/>
+          </a:xfrm>
+          <a:prstGeom prst="rect">
+            <a:avLst/>
+          </a:prstGeom>
+        </p:spPr>
+        <p:txBody>
+          <a:bodyPr vert="horz" lIns="91440" tIns="45720" rIns="91440" bIns="45720" rtlCol="0" anchor="ctr">
+            <a:normAutofit fontScale="97500"/>
+          </a:bodyPr>
+          <a:lstStyle>
+            <a:lvl1pPr algn="l" defTabSz="914400" rtl="0" eaLnBrk="1" latinLnBrk="0" hangingPunct="1">
+              <a:spcBef>
+                <a:spcPct val="0"/>
+              </a:spcBef>
+              <a:buNone/>
+              <a:defRPr sz="4000" kern="1200" spc="-100" baseline="0">
+                <a:solidFill>
+                  <a:schemeClr val="tx2"/>
+                </a:solidFill>
+                <a:latin typeface="+mj-lt"/>
+                <a:ea typeface="+mj-ea"/>
+                <a:cs typeface="+mj-cs"/>
+              </a:defRPr>
+            </a:lvl1pPr>
+          </a:lstStyle>
+          <a:p>
+            <a:r>
+              <a:rPr lang="en-US" sz="1800" dirty="0" smtClean="0"/>
+              <a:t>Group 1</a:t>
+            </a:r>
+            <a:endParaRPr lang="en-US" sz="1800" dirty="0"/>
+          </a:p>
+        </p:txBody>
+      </p:sp>
+    </p:spTree>
+    <p:extLst>
+      <p:ext uri="{BB962C8B-B14F-4D97-AF65-F5344CB8AC3E}">
+        <p14:creationId xmlns:p14="http://schemas.microsoft.com/office/powerpoint/2010/main" val="3100786955"/>
+      </p:ext>
+    </p:extLst>
+  </p:cSld>
+  <p:clrMapOvr>
+    <a:masterClrMapping/>
+  </p:clrMapOvr>
+</p:sld>
+</file>
+
+<file path=ppt/slides/slide12.xml><?xml version="1.0" encoding="utf-8"?>
+<p:sld xmlns:a="http://schemas.openxmlformats.org/drawingml/2006/main" xmlns:r="http://schemas.openxmlformats.org/officeDocument/2006/relationships" xmlns:p="http://schemas.openxmlformats.org/presentationml/2006/main">
+  <p:cSld>
+    <p:spTree>
+      <p:nvGrpSpPr>
+        <p:cNvPr id="1" name=""/>
+        <p:cNvGrpSpPr/>
+        <p:nvPr/>
+      </p:nvGrpSpPr>
+      <p:grpSpPr>
+        <a:xfrm>
+          <a:off x="0" y="0"/>
+          <a:ext cx="0" cy="0"/>
+          <a:chOff x="0" y="0"/>
+          <a:chExt cx="0" cy="0"/>
+        </a:xfrm>
+      </p:grpSpPr>
+      <p:pic>
+        <p:nvPicPr>
+          <p:cNvPr id="4" name="Content Placeholder 3" descr="Screen Shot 2017-04-18 at 9.29.57 AM.png"/>
+          <p:cNvPicPr>
+            <a:picLocks noGrp="1" noChangeAspect="1"/>
+          </p:cNvPicPr>
+          <p:nvPr>
+            <p:ph idx="1"/>
+          </p:nvPr>
+        </p:nvPicPr>
+        <p:blipFill rotWithShape="1">
+          <a:blip r:embed="rId2">
+            <a:extLst>
+              <a:ext uri="{28A0092B-C50C-407E-A947-70E740481C1C}">
+                <a14:useLocalDpi xmlns:a14="http://schemas.microsoft.com/office/drawing/2010/main" val="0"/>
+              </a:ext>
+            </a:extLst>
+          </a:blip>
+          <a:srcRect l="1202" r="836"/>
+          <a:stretch/>
+        </p:blipFill>
+        <p:spPr>
+          <a:xfrm>
+            <a:off x="457200" y="1490964"/>
+            <a:ext cx="3989934" cy="3861622"/>
+          </a:xfrm>
+        </p:spPr>
+      </p:pic>
+      <p:pic>
+        <p:nvPicPr>
+          <p:cNvPr id="5" name="Picture 4" descr="Screen Shot 2017-04-18 at 9.30.48 AM.png"/>
+          <p:cNvPicPr>
+            <a:picLocks noChangeAspect="1"/>
+          </p:cNvPicPr>
+          <p:nvPr/>
+        </p:nvPicPr>
+        <p:blipFill>
+          <a:blip r:embed="rId3">
+            <a:extLst>
+              <a:ext uri="{28A0092B-C50C-407E-A947-70E740481C1C}">
+                <a14:useLocalDpi xmlns:a14="http://schemas.microsoft.com/office/drawing/2010/main" val="0"/>
+              </a:ext>
+            </a:extLst>
+          </a:blip>
+          <a:stretch>
+            <a:fillRect/>
+          </a:stretch>
+        </p:blipFill>
+        <p:spPr>
+          <a:xfrm>
+            <a:off x="5059006" y="1217873"/>
+            <a:ext cx="3172158" cy="2987730"/>
+          </a:xfrm>
+          <a:prstGeom prst="rect">
+            <a:avLst/>
+          </a:prstGeom>
+        </p:spPr>
+      </p:pic>
+      <p:pic>
+        <p:nvPicPr>
+          <p:cNvPr id="6" name="Picture 5" descr="Screen Shot 2017-04-18 at 9.30.38 AM.png"/>
+          <p:cNvPicPr>
+            <a:picLocks noChangeAspect="1"/>
+          </p:cNvPicPr>
+          <p:nvPr/>
+        </p:nvPicPr>
+        <p:blipFill>
+          <a:blip r:embed="rId4">
+            <a:extLst>
+              <a:ext uri="{28A0092B-C50C-407E-A947-70E740481C1C}">
+                <a14:useLocalDpi xmlns:a14="http://schemas.microsoft.com/office/drawing/2010/main" val="0"/>
+              </a:ext>
+            </a:extLst>
+          </a:blip>
+          <a:stretch>
+            <a:fillRect/>
+          </a:stretch>
+        </p:blipFill>
+        <p:spPr>
+          <a:xfrm>
+            <a:off x="4984222" y="3970052"/>
+            <a:ext cx="3486677" cy="2573904"/>
+          </a:xfrm>
+          <a:prstGeom prst="rect">
+            <a:avLst/>
+          </a:prstGeom>
+        </p:spPr>
+      </p:pic>
+      <p:sp>
+        <p:nvSpPr>
+          <p:cNvPr id="7" name="Title 1"/>
+          <p:cNvSpPr txBox="1">
+            <a:spLocks/>
+          </p:cNvSpPr>
+          <p:nvPr/>
+        </p:nvSpPr>
+        <p:spPr>
+          <a:xfrm>
+            <a:off x="1675302" y="743677"/>
+            <a:ext cx="1019128" cy="662742"/>
+          </a:xfrm>
+          <a:prstGeom prst="rect">
+            <a:avLst/>
+          </a:prstGeom>
+        </p:spPr>
+        <p:txBody>
+          <a:bodyPr vert="horz" lIns="91440" tIns="45720" rIns="91440" bIns="45720" rtlCol="0" anchor="ctr">
+            <a:normAutofit fontScale="97500"/>
+          </a:bodyPr>
+          <a:lstStyle>
+            <a:lvl1pPr algn="l" defTabSz="914400" rtl="0" eaLnBrk="1" latinLnBrk="0" hangingPunct="1">
+              <a:spcBef>
+                <a:spcPct val="0"/>
+              </a:spcBef>
+              <a:buNone/>
+              <a:defRPr sz="4000" kern="1200" spc="-100" baseline="0">
+                <a:solidFill>
+                  <a:schemeClr val="tx2"/>
+                </a:solidFill>
+                <a:latin typeface="+mj-lt"/>
+                <a:ea typeface="+mj-ea"/>
+                <a:cs typeface="+mj-cs"/>
+              </a:defRPr>
+            </a:lvl1pPr>
+          </a:lstStyle>
+          <a:p>
+            <a:r>
+              <a:rPr lang="en-US" sz="1800" dirty="0" smtClean="0"/>
+              <a:t>Group 2</a:t>
+            </a:r>
+            <a:endParaRPr lang="en-US" sz="1800" dirty="0"/>
+          </a:p>
+        </p:txBody>
+      </p:sp>
+      <p:sp>
+        <p:nvSpPr>
+          <p:cNvPr id="8" name="Title 1"/>
+          <p:cNvSpPr txBox="1">
+            <a:spLocks/>
+          </p:cNvSpPr>
+          <p:nvPr/>
+        </p:nvSpPr>
+        <p:spPr>
+          <a:xfrm>
+            <a:off x="6197432" y="412306"/>
+            <a:ext cx="1019128" cy="662742"/>
+          </a:xfrm>
+          <a:prstGeom prst="rect">
+            <a:avLst/>
+          </a:prstGeom>
+        </p:spPr>
+        <p:txBody>
+          <a:bodyPr vert="horz" lIns="91440" tIns="45720" rIns="91440" bIns="45720" rtlCol="0" anchor="ctr">
+            <a:normAutofit fontScale="97500"/>
+          </a:bodyPr>
+          <a:lstStyle>
+            <a:lvl1pPr algn="l" defTabSz="914400" rtl="0" eaLnBrk="1" latinLnBrk="0" hangingPunct="1">
+              <a:spcBef>
+                <a:spcPct val="0"/>
+              </a:spcBef>
+              <a:buNone/>
+              <a:defRPr sz="4000" kern="1200" spc="-100" baseline="0">
+                <a:solidFill>
+                  <a:schemeClr val="tx2"/>
+                </a:solidFill>
+                <a:latin typeface="+mj-lt"/>
+                <a:ea typeface="+mj-ea"/>
+                <a:cs typeface="+mj-cs"/>
+              </a:defRPr>
+            </a:lvl1pPr>
+          </a:lstStyle>
+          <a:p>
+            <a:r>
+              <a:rPr lang="en-US" sz="1800" dirty="0" smtClean="0"/>
+              <a:t>Group 3</a:t>
+            </a:r>
+            <a:endParaRPr lang="en-US" sz="1800" dirty="0"/>
+          </a:p>
+        </p:txBody>
+      </p:sp>
+    </p:spTree>
+    <p:extLst>
+      <p:ext uri="{BB962C8B-B14F-4D97-AF65-F5344CB8AC3E}">
+        <p14:creationId xmlns:p14="http://schemas.microsoft.com/office/powerpoint/2010/main" val="2348491373"/>
+      </p:ext>
+    </p:extLst>
+  </p:cSld>
+  <p:clrMapOvr>
+    <a:masterClrMapping/>
+  </p:clrMapOvr>
+</p:sld>
+</file>
+
+<file path=ppt/slides/slide13.xml><?xml version="1.0" encoding="utf-8"?>
+<p:sld xmlns:a="http://schemas.openxmlformats.org/drawingml/2006/main" xmlns:r="http://schemas.openxmlformats.org/officeDocument/2006/relationships" xmlns:p="http://schemas.openxmlformats.org/presentationml/2006/main">
+  <p:cSld>
+    <p:spTree>
+      <p:nvGrpSpPr>
+        <p:cNvPr id="1" name=""/>
+        <p:cNvGrpSpPr/>
+        <p:nvPr/>
+      </p:nvGrpSpPr>
+      <p:grpSpPr>
+        <a:xfrm>
+          <a:off x="0" y="0"/>
+          <a:ext cx="0" cy="0"/>
+          <a:chOff x="0" y="0"/>
+          <a:chExt cx="0" cy="0"/>
+        </a:xfrm>
+      </p:grpSpPr>
+      <p:pic>
+        <p:nvPicPr>
           <p:cNvPr id="4" name="Content Placeholder 3" descr="Screen Shot 2017-04-17 at 9.49.33 PM.png"/>
           <p:cNvPicPr>
             <a:picLocks noGrp="1" noChangeAspect="1"/>
@@ -3950,7 +4344,7 @@
 </p:sld>
 </file>
 
-<file path=ppt/slides/slide12.xml><?xml version="1.0" encoding="utf-8"?>
+<file path=ppt/slides/slide14.xml><?xml version="1.0" encoding="utf-8"?>
 <p:sld xmlns:a="http://schemas.openxmlformats.org/drawingml/2006/main" xmlns:r="http://schemas.openxmlformats.org/officeDocument/2006/relationships" xmlns:p="http://schemas.openxmlformats.org/presentationml/2006/main">
   <p:cSld>
     <p:spTree>
@@ -4107,7 +4501,7 @@
 </p:sld>
 </file>
 
-<file path=ppt/slides/slide13.xml><?xml version="1.0" encoding="utf-8"?>
+<file path=ppt/slides/slide15.xml><?xml version="1.0" encoding="utf-8"?>
 <p:sld xmlns:a="http://schemas.openxmlformats.org/drawingml/2006/main" xmlns:r="http://schemas.openxmlformats.org/officeDocument/2006/relationships" xmlns:p="http://schemas.openxmlformats.org/presentationml/2006/main">
   <p:cSld>
     <p:spTree>
@@ -4178,8 +4572,13 @@
           <a:p>
             <a:r>
               <a:rPr lang="en-US" dirty="0" smtClean="0"/>
-              <a:t>Accuracy: 63%</a:t>
-            </a:r>
+              <a:t>Accuracy: </a:t>
+            </a:r>
+            <a:r>
+              <a:rPr lang="en-US" sz="3200" dirty="0" smtClean="0"/>
+              <a:t>63%</a:t>
+            </a:r>
+            <a:endParaRPr lang="en-US" dirty="0" smtClean="0"/>
           </a:p>
           <a:p>
             <a:r>
@@ -4253,7 +4652,7 @@
 </p:sld>
 </file>
 
-<file path=ppt/slides/slide14.xml><?xml version="1.0" encoding="utf-8"?>
+<file path=ppt/slides/slide16.xml><?xml version="1.0" encoding="utf-8"?>
 <p:sld xmlns:a="http://schemas.openxmlformats.org/drawingml/2006/main" xmlns:r="http://schemas.openxmlformats.org/officeDocument/2006/relationships" xmlns:p="http://schemas.openxmlformats.org/presentationml/2006/main">
   <p:cSld>
     <p:spTree>
@@ -4376,7 +4775,7 @@
 </p:sld>
 </file>
 
-<file path=ppt/slides/slide15.xml><?xml version="1.0" encoding="utf-8"?>
+<file path=ppt/slides/slide17.xml><?xml version="1.0" encoding="utf-8"?>
 <p:sld xmlns:a="http://schemas.openxmlformats.org/drawingml/2006/main" xmlns:r="http://schemas.openxmlformats.org/officeDocument/2006/relationships" xmlns:p="http://schemas.openxmlformats.org/presentationml/2006/main">
   <p:cSld>
     <p:spTree>
@@ -4433,8 +4832,33 @@
           <a:p>
             <a:r>
               <a:rPr lang="en-US" dirty="0" smtClean="0"/>
-              <a:t>Accuracy: 63%</a:t>
-            </a:r>
+              <a:t>Logistic Regression with </a:t>
+            </a:r>
+            <a:r>
+              <a:rPr lang="en-US" dirty="0"/>
+              <a:t>2 </a:t>
+            </a:r>
+            <a:r>
+              <a:rPr lang="en-US" dirty="0" smtClean="0"/>
+              <a:t>Eigenvalues</a:t>
+            </a:r>
+          </a:p>
+          <a:p>
+            <a:r>
+              <a:rPr lang="en-US" dirty="0" smtClean="0"/>
+              <a:t>No Improvement from original Logistic Regression</a:t>
+            </a:r>
+          </a:p>
+          <a:p>
+            <a:r>
+              <a:rPr lang="en-US" dirty="0" smtClean="0"/>
+              <a:t>Accuracy: </a:t>
+            </a:r>
+            <a:r>
+              <a:rPr lang="en-US" sz="3200" dirty="0" smtClean="0"/>
+              <a:t>63%</a:t>
+            </a:r>
+            <a:endParaRPr lang="en-US" dirty="0" smtClean="0"/>
           </a:p>
           <a:p>
             <a:pPr marL="0" indent="0">
@@ -4446,7 +4870,7 @@
       </p:sp>
       <p:pic>
         <p:nvPicPr>
-          <p:cNvPr id="4" name="Picture 3" descr="Screen Shot 2017-04-17 at 10.35.58 PM.png"/>
+          <p:cNvPr id="7" name="Picture 6" descr="Screen Shot 2017-04-18 at 10.31.15 AM.png"/>
           <p:cNvPicPr>
             <a:picLocks noChangeAspect="1"/>
           </p:cNvPicPr>
@@ -4466,8 +4890,8 @@
         </p:blipFill>
         <p:spPr>
           <a:xfrm>
-            <a:off x="2501900" y="2734700"/>
-            <a:ext cx="4127500" cy="2171700"/>
+            <a:off x="2301845" y="4139492"/>
+            <a:ext cx="4254500" cy="1828800"/>
           </a:xfrm>
           <a:prstGeom prst="rect">
             <a:avLst/>
@@ -4494,7 +4918,7 @@
 </p:sld>
 </file>
 
-<file path=ppt/slides/slide16.xml><?xml version="1.0" encoding="utf-8"?>
+<file path=ppt/slides/slide18.xml><?xml version="1.0" encoding="utf-8"?>
 <p:sld xmlns:a="http://schemas.openxmlformats.org/drawingml/2006/main" xmlns:r="http://schemas.openxmlformats.org/officeDocument/2006/relationships" xmlns:p="http://schemas.openxmlformats.org/presentationml/2006/main">
   <p:cSld>
     <p:spTree>
@@ -4568,8 +4992,36 @@
           </a:p>
           <a:p>
             <a:r>
-              <a:rPr lang="en-US" sz="2000" dirty="0" smtClean="0"/>
-              <a:t>Accuracy: 78%</a:t>
+              <a:rPr lang="en-US" sz="2000" dirty="0" smtClean="0">
+                <a:solidFill>
+                  <a:srgbClr val="D2533C"/>
+                </a:solidFill>
+              </a:rPr>
+              <a:t>The model is </a:t>
+            </a:r>
+            <a:r>
+              <a:rPr lang="en-US" sz="2800" dirty="0" smtClean="0">
+                <a:solidFill>
+                  <a:srgbClr val="D2533C"/>
+                </a:solidFill>
+              </a:rPr>
+              <a:t>78%</a:t>
+            </a:r>
+            <a:r>
+              <a:rPr lang="en-US" sz="1800" dirty="0" smtClean="0">
+                <a:solidFill>
+                  <a:srgbClr val="D2533C"/>
+                </a:solidFill>
+              </a:rPr>
+              <a:t> </a:t>
+            </a:r>
+            <a:r>
+              <a:rPr lang="en-US" sz="2000" dirty="0" smtClean="0">
+                <a:solidFill>
+                  <a:srgbClr val="D2533C"/>
+                </a:solidFill>
+              </a:rPr>
+              <a:t>accurate at predicting whether a driver will be ticketed or arrested once pulled over </a:t>
             </a:r>
           </a:p>
           <a:p>
@@ -4663,7 +5115,7 @@
 </p:sld>
 </file>
 
-<file path=ppt/slides/slide17.xml><?xml version="1.0" encoding="utf-8"?>
+<file path=ppt/slides/slide19.xml><?xml version="1.0" encoding="utf-8"?>
 <p:sld xmlns:a="http://schemas.openxmlformats.org/drawingml/2006/main" xmlns:r="http://schemas.openxmlformats.org/officeDocument/2006/relationships" xmlns:p="http://schemas.openxmlformats.org/presentationml/2006/main">
   <p:cSld>
     <p:spTree>

</xml_diff>